<commit_message>
new version of presentation additional diagrams
</commit_message>
<xml_diff>
--- a/monolit/documentation/microservices lectures/HTTP + REST.pptx
+++ b/monolit/documentation/microservices lectures/HTTP + REST.pptx
@@ -5,7 +5,7 @@
     <p:sldMasterId id="2147483648" r:id="rId1"/>
   </p:sldMasterIdLst>
   <p:notesMasterIdLst>
-    <p:notesMasterId r:id="rId29"/>
+    <p:notesMasterId r:id="rId30"/>
   </p:notesMasterIdLst>
   <p:sldIdLst>
     <p:sldId id="256" r:id="rId2"/>
@@ -35,6 +35,7 @@
     <p:sldId id="269" r:id="rId26"/>
     <p:sldId id="271" r:id="rId27"/>
     <p:sldId id="261" r:id="rId28"/>
+    <p:sldId id="289" r:id="rId29"/>
   </p:sldIdLst>
   <p:sldSz cx="9144000" cy="6858000" type="screen4x3"/>
   <p:notesSz cx="6858000" cy="9144000"/>
@@ -218,7 +219,7 @@
           <a:p>
             <a:fld id="{6737019A-20A8-4E25-AB94-2585A166F0A3}" type="datetimeFigureOut">
               <a:rPr lang="en-GB" smtClean="0"/>
-              <a:t>11/03/2019</a:t>
+              <a:t>26/03/2019</a:t>
             </a:fld>
             <a:endParaRPr lang="en-GB"/>
           </a:p>
@@ -1318,7 +1319,7 @@
           <a:p>
             <a:fld id="{B8AC57D2-9CA0-4D85-89A6-86FB0E8F25F6}" type="datetimeFigureOut">
               <a:rPr lang="en-GB" smtClean="0"/>
-              <a:t>11/03/2019</a:t>
+              <a:t>26/03/2019</a:t>
             </a:fld>
             <a:endParaRPr lang="en-GB"/>
           </a:p>
@@ -1488,7 +1489,7 @@
           <a:p>
             <a:fld id="{B8AC57D2-9CA0-4D85-89A6-86FB0E8F25F6}" type="datetimeFigureOut">
               <a:rPr lang="en-GB" smtClean="0"/>
-              <a:t>11/03/2019</a:t>
+              <a:t>26/03/2019</a:t>
             </a:fld>
             <a:endParaRPr lang="en-GB"/>
           </a:p>
@@ -1668,7 +1669,7 @@
           <a:p>
             <a:fld id="{B8AC57D2-9CA0-4D85-89A6-86FB0E8F25F6}" type="datetimeFigureOut">
               <a:rPr lang="en-GB" smtClean="0"/>
-              <a:t>11/03/2019</a:t>
+              <a:t>26/03/2019</a:t>
             </a:fld>
             <a:endParaRPr lang="en-GB"/>
           </a:p>
@@ -1838,7 +1839,7 @@
           <a:p>
             <a:fld id="{B8AC57D2-9CA0-4D85-89A6-86FB0E8F25F6}" type="datetimeFigureOut">
               <a:rPr lang="en-GB" smtClean="0"/>
-              <a:t>11/03/2019</a:t>
+              <a:t>26/03/2019</a:t>
             </a:fld>
             <a:endParaRPr lang="en-GB"/>
           </a:p>
@@ -2084,7 +2085,7 @@
           <a:p>
             <a:fld id="{B8AC57D2-9CA0-4D85-89A6-86FB0E8F25F6}" type="datetimeFigureOut">
               <a:rPr lang="en-GB" smtClean="0"/>
-              <a:t>11/03/2019</a:t>
+              <a:t>26/03/2019</a:t>
             </a:fld>
             <a:endParaRPr lang="en-GB"/>
           </a:p>
@@ -2372,7 +2373,7 @@
           <a:p>
             <a:fld id="{B8AC57D2-9CA0-4D85-89A6-86FB0E8F25F6}" type="datetimeFigureOut">
               <a:rPr lang="en-GB" smtClean="0"/>
-              <a:t>11/03/2019</a:t>
+              <a:t>26/03/2019</a:t>
             </a:fld>
             <a:endParaRPr lang="en-GB"/>
           </a:p>
@@ -2794,7 +2795,7 @@
           <a:p>
             <a:fld id="{B8AC57D2-9CA0-4D85-89A6-86FB0E8F25F6}" type="datetimeFigureOut">
               <a:rPr lang="en-GB" smtClean="0"/>
-              <a:t>11/03/2019</a:t>
+              <a:t>26/03/2019</a:t>
             </a:fld>
             <a:endParaRPr lang="en-GB"/>
           </a:p>
@@ -2912,7 +2913,7 @@
           <a:p>
             <a:fld id="{B8AC57D2-9CA0-4D85-89A6-86FB0E8F25F6}" type="datetimeFigureOut">
               <a:rPr lang="en-GB" smtClean="0"/>
-              <a:t>11/03/2019</a:t>
+              <a:t>26/03/2019</a:t>
             </a:fld>
             <a:endParaRPr lang="en-GB"/>
           </a:p>
@@ -3007,7 +3008,7 @@
           <a:p>
             <a:fld id="{B8AC57D2-9CA0-4D85-89A6-86FB0E8F25F6}" type="datetimeFigureOut">
               <a:rPr lang="en-GB" smtClean="0"/>
-              <a:t>11/03/2019</a:t>
+              <a:t>26/03/2019</a:t>
             </a:fld>
             <a:endParaRPr lang="en-GB"/>
           </a:p>
@@ -3284,7 +3285,7 @@
           <a:p>
             <a:fld id="{B8AC57D2-9CA0-4D85-89A6-86FB0E8F25F6}" type="datetimeFigureOut">
               <a:rPr lang="en-GB" smtClean="0"/>
-              <a:t>11/03/2019</a:t>
+              <a:t>26/03/2019</a:t>
             </a:fld>
             <a:endParaRPr lang="en-GB"/>
           </a:p>
@@ -3537,7 +3538,7 @@
           <a:p>
             <a:fld id="{B8AC57D2-9CA0-4D85-89A6-86FB0E8F25F6}" type="datetimeFigureOut">
               <a:rPr lang="en-GB" smtClean="0"/>
-              <a:t>11/03/2019</a:t>
+              <a:t>26/03/2019</a:t>
             </a:fld>
             <a:endParaRPr lang="en-GB"/>
           </a:p>
@@ -3750,7 +3751,7 @@
           <a:p>
             <a:fld id="{B8AC57D2-9CA0-4D85-89A6-86FB0E8F25F6}" type="datetimeFigureOut">
               <a:rPr lang="en-GB" smtClean="0"/>
-              <a:t>11/03/2019</a:t>
+              <a:t>26/03/2019</a:t>
             </a:fld>
             <a:endParaRPr lang="en-GB"/>
           </a:p>
@@ -4163,6 +4164,18 @@
           <a:bodyPr/>
           <a:lstStyle/>
           <a:p>
+            <a:r>
+              <a:rPr lang="pl-PL" dirty="0" smtClean="0"/>
+              <a:t>Arkadiusz Labus</a:t>
+            </a:r>
+          </a:p>
+          <a:p>
+            <a:r>
+              <a:rPr lang="pl-PL" dirty="0" smtClean="0"/>
+              <a:t>Rafał Rybacki</a:t>
+            </a:r>
+          </a:p>
+          <a:p>
             <a:endParaRPr lang="en-GB" dirty="0"/>
           </a:p>
         </p:txBody>
@@ -5463,26 +5476,74 @@
           <a:p>
             <a:r>
               <a:rPr lang="pl-PL" dirty="0" smtClean="0"/>
-              <a:t>REST API</a:t>
-            </a:r>
-          </a:p>
-          <a:p>
+              <a:t>Trochę teorii</a:t>
+            </a:r>
+          </a:p>
+          <a:p>
+            <a:pPr lvl="1">
+              <a:buFont typeface="Wingdings" panose="05000000000000000000" pitchFamily="2" charset="2"/>
+              <a:buChar char="§"/>
+            </a:pPr>
+            <a:r>
+              <a:rPr lang="pl-PL" dirty="0" smtClean="0"/>
+              <a:t>REST </a:t>
+            </a:r>
+            <a:r>
+              <a:rPr lang="pl-PL" dirty="0" smtClean="0"/>
+              <a:t>API</a:t>
+            </a:r>
+          </a:p>
+          <a:p>
+            <a:pPr lvl="1">
+              <a:buFont typeface="Wingdings" panose="05000000000000000000" pitchFamily="2" charset="2"/>
+              <a:buChar char="§"/>
+            </a:pPr>
             <a:r>
               <a:rPr lang="pl-PL" dirty="0" smtClean="0"/>
               <a:t>Protokół HTTP</a:t>
             </a:r>
           </a:p>
           <a:p>
+            <a:pPr lvl="1">
+              <a:buFont typeface="Wingdings" panose="05000000000000000000" pitchFamily="2" charset="2"/>
+              <a:buChar char="§"/>
+            </a:pPr>
             <a:r>
               <a:rPr lang="pl-PL" dirty="0" smtClean="0"/>
               <a:t>Implementacja REST w Javie</a:t>
             </a:r>
+          </a:p>
+          <a:p>
+            <a:pPr lvl="1">
+              <a:buFont typeface="Wingdings" panose="05000000000000000000" pitchFamily="2" charset="2"/>
+              <a:buChar char="§"/>
+            </a:pPr>
+            <a:r>
+              <a:rPr lang="pl-PL" dirty="0" smtClean="0"/>
+              <a:t>Dobre praktyki </a:t>
+            </a:r>
+            <a:r>
+              <a:rPr lang="pl-PL" dirty="0" smtClean="0"/>
+              <a:t>programistyczne</a:t>
+            </a:r>
+          </a:p>
+          <a:p>
+            <a:r>
+              <a:rPr lang="pl-PL" dirty="0" smtClean="0"/>
+              <a:t>Przerwa </a:t>
+            </a:r>
             <a:endParaRPr lang="pl-PL" dirty="0" smtClean="0"/>
           </a:p>
           <a:p>
             <a:r>
               <a:rPr lang="pl-PL" dirty="0" smtClean="0"/>
-              <a:t>Dobre praktyki programistyczne</a:t>
+              <a:t>Trochę kodowania </a:t>
+            </a:r>
+            <a:r>
+              <a:rPr lang="pl-PL" dirty="0" smtClean="0">
+                <a:sym typeface="Wingdings" panose="05000000000000000000" pitchFamily="2" charset="2"/>
+              </a:rPr>
+              <a:t></a:t>
             </a:r>
             <a:endParaRPr lang="en-GB" dirty="0"/>
           </a:p>
@@ -6748,6 +6809,111 @@
       </p:par>
     </p:tnLst>
   </p:timing>
+</p:sld>
+</file>
+
+<file path=ppt/slides/slide28.xml><?xml version="1.0" encoding="utf-8"?>
+<p:sld xmlns:a="http://schemas.openxmlformats.org/drawingml/2006/main" xmlns:r="http://schemas.openxmlformats.org/officeDocument/2006/relationships" xmlns:p="http://schemas.openxmlformats.org/presentationml/2006/main">
+  <p:cSld>
+    <p:spTree>
+      <p:nvGrpSpPr>
+        <p:cNvPr id="1" name=""/>
+        <p:cNvGrpSpPr/>
+        <p:nvPr/>
+      </p:nvGrpSpPr>
+      <p:grpSpPr>
+        <a:xfrm>
+          <a:off x="0" y="0"/>
+          <a:ext cx="0" cy="0"/>
+          <a:chOff x="0" y="0"/>
+          <a:chExt cx="0" cy="0"/>
+        </a:xfrm>
+      </p:grpSpPr>
+      <p:sp>
+        <p:nvSpPr>
+          <p:cNvPr id="2" name="Title 1"/>
+          <p:cNvSpPr>
+            <a:spLocks noGrp="1"/>
+          </p:cNvSpPr>
+          <p:nvPr>
+            <p:ph type="title"/>
+          </p:nvPr>
+        </p:nvSpPr>
+        <p:spPr/>
+        <p:txBody>
+          <a:bodyPr/>
+          <a:lstStyle/>
+          <a:p>
+            <a:r>
+              <a:rPr lang="pl-PL" dirty="0" smtClean="0"/>
+              <a:t>A teraz czas na zabawę </a:t>
+            </a:r>
+            <a:endParaRPr lang="en-GB" dirty="0"/>
+          </a:p>
+        </p:txBody>
+      </p:sp>
+      <p:sp>
+        <p:nvSpPr>
+          <p:cNvPr id="3" name="Content Placeholder 2"/>
+          <p:cNvSpPr>
+            <a:spLocks noGrp="1"/>
+          </p:cNvSpPr>
+          <p:nvPr>
+            <p:ph idx="1"/>
+          </p:nvPr>
+        </p:nvSpPr>
+        <p:spPr/>
+        <p:txBody>
+          <a:bodyPr/>
+          <a:lstStyle/>
+          <a:p>
+            <a:r>
+              <a:rPr lang="pl-PL" dirty="0" smtClean="0"/>
+              <a:t>Repozytorium github:</a:t>
+            </a:r>
+          </a:p>
+          <a:p>
+            <a:pPr marL="457200" lvl="1" indent="0">
+              <a:buNone/>
+            </a:pPr>
+            <a:r>
+              <a:rPr lang="en-GB" dirty="0">
+                <a:hlinkClick r:id="rId2"/>
+              </a:rPr>
+              <a:t>https://</a:t>
+            </a:r>
+            <a:r>
+              <a:rPr lang="en-GB" dirty="0" smtClean="0">
+                <a:hlinkClick r:id="rId2"/>
+              </a:rPr>
+              <a:t>github.com/rybeek84/microservices-part1</a:t>
+            </a:r>
+            <a:endParaRPr lang="pl-PL" dirty="0" smtClean="0"/>
+          </a:p>
+          <a:p>
+            <a:pPr marL="457200" lvl="1" indent="0">
+              <a:buNone/>
+            </a:pPr>
+            <a:endParaRPr lang="pl-PL" dirty="0"/>
+          </a:p>
+          <a:p>
+            <a:pPr marL="0" indent="0">
+              <a:buNone/>
+            </a:pPr>
+            <a:endParaRPr lang="en-GB" dirty="0"/>
+          </a:p>
+        </p:txBody>
+      </p:sp>
+    </p:spTree>
+    <p:extLst>
+      <p:ext uri="{BB962C8B-B14F-4D97-AF65-F5344CB8AC3E}">
+        <p14:creationId xmlns:p14="http://schemas.microsoft.com/office/powerpoint/2010/main" val="3030117730"/>
+      </p:ext>
+    </p:extLst>
+  </p:cSld>
+  <p:clrMapOvr>
+    <a:masterClrMapping/>
+  </p:clrMapOvr>
 </p:sld>
 </file>
 

</xml_diff>